<commit_message>
Added folder for speeches and moved application presentations to its own folder.
</commit_message>
<xml_diff>
--- a/Presentation.pptx
+++ b/Presentation.pptx
@@ -5,7 +5,7 @@
     <p:sldMasterId id="2147483711" r:id="rId1"/>
   </p:sldMasterIdLst>
   <p:notesMasterIdLst>
-    <p:notesMasterId r:id="rId30"/>
+    <p:notesMasterId r:id="rId29"/>
   </p:notesMasterIdLst>
   <p:sldIdLst>
     <p:sldId id="286" r:id="rId2"/>
@@ -35,7 +35,6 @@
     <p:sldId id="262" r:id="rId26"/>
     <p:sldId id="264" r:id="rId27"/>
     <p:sldId id="265" r:id="rId28"/>
-    <p:sldId id="285" r:id="rId29"/>
   </p:sldIdLst>
   <p:sldSz cx="9144000" cy="6858000" type="screen4x3"/>
   <p:notesSz cx="6858000" cy="9144000"/>
@@ -2278,7 +2277,6 @@
               <a:rPr lang="en-US" dirty="0" smtClean="0"/>
               <a:t>Instead, the designer creates the structure of the network – with the number of input, outputs, hidden layers and neurons; and a set inputs paired with the expected output, called the training set. This training set can then be used by back propagation to train the network.</a:t>
             </a:r>
-            <a:endParaRPr lang="en-US" dirty="0" smtClean="0"/>
           </a:p>
         </p:txBody>
       </p:sp>
@@ -2402,7 +2400,6 @@
               <a:rPr lang="en-GB" dirty="0" smtClean="0"/>
               <a:t>Once the training set is finished, the algorithm begins a train and test loop which starts by choosing any pair in the training set and runs the selected input through the network. Then, the errors between the output of the network and the expected output are measured and each synaptic weight is adjusted with this error. This loop is repeated for a set number of iterations, or until the total error of the network becomes acceptable.</a:t>
             </a:r>
-            <a:endParaRPr lang="en-GB" dirty="0" smtClean="0"/>
           </a:p>
         </p:txBody>
       </p:sp>
@@ -2561,7 +2558,6 @@
               <a:rPr lang="en-GB" dirty="0" smtClean="0"/>
               <a:t>First, an input from the training set is feed through the network as before. Next the error of each output is calculated which is the output of the network minus the expected output.</a:t>
             </a:r>
-            <a:endParaRPr lang="en-GB" dirty="0" smtClean="0"/>
           </a:p>
         </p:txBody>
       </p:sp>
@@ -3090,7 +3086,6 @@
               <a:rPr lang="en-GB" dirty="0" smtClean="0"/>
               <a:t>The constant LR is the learning rate. This is a small value, usually around 0.1, which prevents from adjusting the weights too much which causes the network to overcompensate.</a:t>
             </a:r>
-            <a:endParaRPr lang="en-GB" dirty="0" smtClean="0"/>
           </a:p>
         </p:txBody>
       </p:sp>
@@ -3268,7 +3263,6 @@
               <a:rPr lang="en-GB" dirty="0" smtClean="0"/>
               <a:t>A weight adjustment using momentum is the adjustment from the slide before, plus the product of the previous weight adjustment and the momentum constant, usually around 0.05.</a:t>
             </a:r>
-            <a:endParaRPr lang="en-GB" dirty="0" smtClean="0"/>
           </a:p>
         </p:txBody>
       </p:sp>
@@ -4774,15 +4768,7 @@
                 <a:ea typeface="DejaVu Sans" charset="0"/>
                 <a:cs typeface="DejaVu Sans" charset="0"/>
               </a:rPr>
-              <a:t>For each one talk about how it can be used in a neural network (or perhaps do this all at once at the end</a:t>
-            </a:r>
-            <a:r>
-              <a:rPr lang="en-GB" sz="2000" dirty="0" smtClean="0">
-                <a:latin typeface="Arial" panose="020B0604020202020204" pitchFamily="34" charset="0"/>
-                <a:ea typeface="DejaVu Sans" charset="0"/>
-                <a:cs typeface="DejaVu Sans" charset="0"/>
-              </a:rPr>
-              <a:t>).</a:t>
+              <a:t>For each one talk about how it can be used in a neural network (or perhaps do this all at once at the end).</a:t>
             </a:r>
           </a:p>
         </p:txBody>
@@ -25120,7 +25106,6 @@
               <a:rPr lang="en-GB" sz="2000" dirty="0"/>
               <a:t>Repeat 2i - iii until the training set is empty</a:t>
             </a:r>
-            <a:endParaRPr lang="en-GB" sz="2000" dirty="0"/>
           </a:p>
         </p:txBody>
       </p:sp>
@@ -26009,179 +25994,6 @@
     <a:masterClrMapping/>
   </p:clrMapOvr>
   <p:transition/>
-  <p:timing>
-    <p:tnLst>
-      <p:par>
-        <p:cTn id="1" dur="indefinite" restart="never" nodeType="tmRoot"/>
-      </p:par>
-    </p:tnLst>
-  </p:timing>
-</p:sld>
-</file>
-
-<file path=ppt/slides/slide28.xml><?xml version="1.0" encoding="utf-8"?>
-<p:sld xmlns:a="http://schemas.openxmlformats.org/drawingml/2006/main" xmlns:r="http://schemas.openxmlformats.org/officeDocument/2006/relationships" xmlns:p="http://schemas.openxmlformats.org/presentationml/2006/main">
-  <p:cSld>
-    <p:spTree>
-      <p:nvGrpSpPr>
-        <p:cNvPr id="1" name=""/>
-        <p:cNvGrpSpPr/>
-        <p:nvPr/>
-      </p:nvGrpSpPr>
-      <p:grpSpPr>
-        <a:xfrm>
-          <a:off x="0" y="0"/>
-          <a:ext cx="0" cy="0"/>
-          <a:chOff x="0" y="0"/>
-          <a:chExt cx="0" cy="0"/>
-        </a:xfrm>
-      </p:grpSpPr>
-      <p:sp>
-        <p:nvSpPr>
-          <p:cNvPr id="4" name="Rectangle 1"/>
-          <p:cNvSpPr>
-            <a:spLocks noGrp="1" noChangeArrowheads="1"/>
-          </p:cNvSpPr>
-          <p:nvPr>
-            <p:ph type="title"/>
-          </p:nvPr>
-        </p:nvSpPr>
-        <p:spPr>
-          <a:xfrm>
-            <a:off x="456481" y="273629"/>
-            <a:ext cx="8228160" cy="1144921"/>
-          </a:xfrm>
-          <a:ln/>
-        </p:spPr>
-        <p:txBody>
-          <a:bodyPr tIns="35268">
-            <a:normAutofit/>
-          </a:bodyPr>
-          <a:lstStyle/>
-          <a:p>
-            <a:pPr>
-              <a:tabLst>
-                <a:tab pos="0" algn="l"/>
-                <a:tab pos="406086" algn="l"/>
-                <a:tab pos="813612" algn="l"/>
-                <a:tab pos="1221138" algn="l"/>
-                <a:tab pos="1628664" algn="l"/>
-                <a:tab pos="2036190" algn="l"/>
-                <a:tab pos="2443717" algn="l"/>
-                <a:tab pos="2851242" algn="l"/>
-                <a:tab pos="3258769" algn="l"/>
-                <a:tab pos="3666294" algn="l"/>
-                <a:tab pos="4073821" algn="l"/>
-                <a:tab pos="4481346" algn="l"/>
-                <a:tab pos="4888873" algn="l"/>
-                <a:tab pos="5296398" algn="l"/>
-                <a:tab pos="5703925" algn="l"/>
-                <a:tab pos="6111450" algn="l"/>
-                <a:tab pos="6518977" algn="l"/>
-                <a:tab pos="6926502" algn="l"/>
-                <a:tab pos="7334029" algn="l"/>
-                <a:tab pos="7741554" algn="l"/>
-                <a:tab pos="8149081" algn="l"/>
-              </a:tabLst>
-            </a:pPr>
-            <a:r>
-              <a:rPr lang="en-GB" sz="2800" dirty="0"/>
-              <a:t>The Healthcare prize</a:t>
-            </a:r>
-            <a:endParaRPr lang="en-GB" sz="2800" dirty="0"/>
-          </a:p>
-        </p:txBody>
-      </p:sp>
-      <p:pic>
-        <p:nvPicPr>
-          <p:cNvPr id="7" name="Picture 1"/>
-          <p:cNvPicPr>
-            <a:picLocks noChangeAspect="1" noChangeArrowheads="1"/>
-          </p:cNvPicPr>
-          <p:nvPr/>
-        </p:nvPicPr>
-        <p:blipFill>
-          <a:blip r:embed="rId2">
-            <a:extLst>
-              <a:ext uri="{28A0092B-C50C-407E-A947-70E740481C1C}">
-                <a14:useLocalDpi xmlns:a14="http://schemas.microsoft.com/office/drawing/2010/main" val="0"/>
-              </a:ext>
-            </a:extLst>
-          </a:blip>
-          <a:srcRect l="29970" t="9978" r="24973" b="9978"/>
-          <a:stretch>
-            <a:fillRect/>
-          </a:stretch>
-        </p:blipFill>
-        <p:spPr bwMode="auto">
-          <a:xfrm>
-            <a:off x="2113569" y="1392456"/>
-            <a:ext cx="4669606" cy="4700840"/>
-          </a:xfrm>
-          <a:prstGeom prst="rect">
-            <a:avLst/>
-          </a:prstGeom>
-          <a:noFill/>
-          <a:ln>
-            <a:noFill/>
-          </a:ln>
-          <a:effectLst/>
-          <a:extLst>
-            <a:ext uri="{909E8E84-426E-40DD-AFC4-6F175D3DCCD1}">
-              <a14:hiddenFill xmlns:a14="http://schemas.microsoft.com/office/drawing/2010/main">
-                <a:blipFill dpi="0" rotWithShape="0">
-                  <a:blip/>
-                  <a:srcRect l="29970" t="9978" r="24973" b="9978"/>
-                  <a:stretch>
-                    <a:fillRect/>
-                  </a:stretch>
-                </a:blipFill>
-              </a14:hiddenFill>
-            </a:ext>
-            <a:ext uri="{91240B29-F687-4F45-9708-019B960494DF}">
-              <a14:hiddenLine xmlns:a14="http://schemas.microsoft.com/office/drawing/2010/main" w="9525" cap="flat">
-                <a:solidFill>
-                  <a:srgbClr val="808080"/>
-                </a:solidFill>
-                <a:round/>
-                <a:headEnd/>
-                <a:tailEnd/>
-              </a14:hiddenLine>
-            </a:ext>
-            <a:ext uri="{AF507438-7753-43E0-B8FC-AC1667EBCBE1}">
-              <a14:hiddenEffects xmlns:a14="http://schemas.microsoft.com/office/drawing/2010/main">
-                <a:effectLst>
-                  <a:outerShdw dist="35921" dir="2700000" algn="ctr" rotWithShape="0">
-                    <a:srgbClr val="808080"/>
-                  </a:outerShdw>
-                </a:effectLst>
-              </a14:hiddenEffects>
-            </a:ext>
-          </a:extLst>
-        </p:spPr>
-      </p:pic>
-    </p:spTree>
-    <p:extLst>
-      <p:ext uri="{BB962C8B-B14F-4D97-AF65-F5344CB8AC3E}">
-        <p14:creationId xmlns:p14="http://schemas.microsoft.com/office/powerpoint/2010/main" val="4130899420"/>
-      </p:ext>
-    </p:extLst>
-  </p:cSld>
-  <p:clrMapOvr>
-    <a:masterClrMapping/>
-  </p:clrMapOvr>
-  <mc:AlternateContent xmlns:mc="http://schemas.openxmlformats.org/markup-compatibility/2006" xmlns:p14="http://schemas.microsoft.com/office/powerpoint/2010/main">
-    <mc:Choice Requires="p14">
-      <p:transition spd="med" p14:dur="700">
-        <p:fade/>
-      </p:transition>
-    </mc:Choice>
-    <mc:Fallback xmlns="">
-      <p:transition spd="med">
-        <p:fade/>
-      </p:transition>
-    </mc:Fallback>
-  </mc:AlternateContent>
   <p:timing>
     <p:tnLst>
       <p:par>
@@ -29104,7 +28916,6 @@
               <a:rPr lang="en-GB" sz="2800" dirty="0"/>
               <a:t>Possible Drawbacks</a:t>
             </a:r>
-            <a:endParaRPr lang="en-GB" sz="2800" dirty="0"/>
           </a:p>
         </p:txBody>
       </p:sp>

</xml_diff>